<commit_message>
pembaruan terakhir minus video
</commit_message>
<xml_diff>
--- a/gambar.pptx
+++ b/gambar.pptx
@@ -14,6 +14,7 @@
     <p:sldId id="262" r:id="rId8"/>
     <p:sldId id="263" r:id="rId9"/>
     <p:sldId id="264" r:id="rId10"/>
+    <p:sldId id="265" r:id="rId11"/>
   </p:sldIdLst>
   <p:sldSz cx="12192000" cy="6858000"/>
   <p:notesSz cx="6858000" cy="9144000"/>
@@ -3348,10 +3349,10 @@
       </p:grpSpPr>
       <p:grpSp>
         <p:nvGrpSpPr>
-          <p:cNvPr id="27" name="Group 26">
+          <p:cNvPr id="2" name="Group 1">
             <a:extLst>
               <a:ext uri="{FF2B5EF4-FFF2-40B4-BE49-F238E27FC236}">
-                <a16:creationId xmlns:a16="http://schemas.microsoft.com/office/drawing/2014/main" id="{4BCBB2A7-3F59-4B78-9195-D97C178ECA1B}"/>
+                <a16:creationId xmlns:a16="http://schemas.microsoft.com/office/drawing/2014/main" id="{FF972666-FD8B-4C4C-95B0-7486D27D5B93}"/>
               </a:ext>
             </a:extLst>
           </p:cNvPr>
@@ -3360,9 +3361,9 @@
         </p:nvGrpSpPr>
         <p:grpSpPr>
           <a:xfrm>
-            <a:off x="588819" y="354446"/>
+            <a:off x="884383" y="465282"/>
             <a:ext cx="4075545" cy="3297372"/>
-            <a:chOff x="1300019" y="1047173"/>
+            <a:chOff x="884383" y="465282"/>
             <a:chExt cx="4075545" cy="3297372"/>
           </a:xfrm>
         </p:grpSpPr>
@@ -3380,7 +3381,7 @@
           </p:nvSpPr>
           <p:spPr>
             <a:xfrm>
-              <a:off x="1353128" y="1533237"/>
+              <a:off x="937492" y="951346"/>
               <a:ext cx="623455" cy="621145"/>
             </a:xfrm>
             <a:prstGeom prst="ellipse">
@@ -3439,7 +3440,7 @@
           </p:nvSpPr>
           <p:spPr>
             <a:xfrm>
-              <a:off x="2105892" y="1533236"/>
+              <a:off x="1690256" y="951345"/>
               <a:ext cx="623455" cy="621145"/>
             </a:xfrm>
             <a:prstGeom prst="ellipse">
@@ -3498,7 +3499,7 @@
           </p:nvSpPr>
           <p:spPr>
             <a:xfrm>
-              <a:off x="1729510" y="2154381"/>
+              <a:off x="1313874" y="1572490"/>
               <a:ext cx="623455" cy="621145"/>
             </a:xfrm>
             <a:prstGeom prst="ellipse">
@@ -3557,7 +3558,7 @@
           </p:nvSpPr>
           <p:spPr>
             <a:xfrm>
-              <a:off x="3611419" y="1533237"/>
+              <a:off x="2983347" y="957223"/>
               <a:ext cx="623455" cy="621145"/>
             </a:xfrm>
             <a:prstGeom prst="ellipse">
@@ -3616,7 +3617,7 @@
           </p:nvSpPr>
           <p:spPr>
             <a:xfrm>
-              <a:off x="4364183" y="1533236"/>
+              <a:off x="3948547" y="951345"/>
               <a:ext cx="623455" cy="621145"/>
             </a:xfrm>
             <a:prstGeom prst="ellipse">
@@ -3675,7 +3676,7 @@
           </p:nvSpPr>
           <p:spPr>
             <a:xfrm>
-              <a:off x="3611418" y="1997363"/>
+              <a:off x="3465947" y="966460"/>
               <a:ext cx="623455" cy="621145"/>
             </a:xfrm>
             <a:prstGeom prst="ellipse">
@@ -3734,7 +3735,7 @@
           </p:nvSpPr>
           <p:spPr>
             <a:xfrm>
-              <a:off x="1300019" y="1047173"/>
+              <a:off x="884383" y="465282"/>
               <a:ext cx="1496291" cy="350982"/>
             </a:xfrm>
             <a:prstGeom prst="rect">
@@ -3793,7 +3794,7 @@
           </p:nvSpPr>
           <p:spPr>
             <a:xfrm>
-              <a:off x="3260437" y="1058721"/>
+              <a:off x="2844801" y="476830"/>
               <a:ext cx="2115127" cy="350982"/>
             </a:xfrm>
             <a:prstGeom prst="rect">
@@ -3900,7 +3901,7 @@
           </p:nvGrpSpPr>
           <p:grpSpPr>
             <a:xfrm>
-              <a:off x="1893455" y="2718958"/>
+              <a:off x="1477819" y="2137067"/>
               <a:ext cx="2341418" cy="1625587"/>
               <a:chOff x="1976583" y="3103412"/>
               <a:chExt cx="2341418" cy="1570175"/>
@@ -4172,6 +4173,1098 @@
     <p:extLst>
       <p:ext uri="{BB962C8B-B14F-4D97-AF65-F5344CB8AC3E}">
         <p14:creationId xmlns:p14="http://schemas.microsoft.com/office/powerpoint/2010/main" val="4113985401"/>
+      </p:ext>
+    </p:extLst>
+  </p:cSld>
+  <p:clrMapOvr>
+    <a:masterClrMapping/>
+  </p:clrMapOvr>
+</p:sld>
+</file>
+
+<file path=ppt/slides/slide10.xml><?xml version="1.0" encoding="utf-8"?>
+<p:sld xmlns:a="http://schemas.openxmlformats.org/drawingml/2006/main" xmlns:r="http://schemas.openxmlformats.org/officeDocument/2006/relationships" xmlns:p="http://schemas.openxmlformats.org/presentationml/2006/main">
+  <p:cSld>
+    <p:spTree>
+      <p:nvGrpSpPr>
+        <p:cNvPr id="1" name=""/>
+        <p:cNvGrpSpPr/>
+        <p:nvPr/>
+      </p:nvGrpSpPr>
+      <p:grpSpPr>
+        <a:xfrm>
+          <a:off x="0" y="0"/>
+          <a:ext cx="0" cy="0"/>
+          <a:chOff x="0" y="0"/>
+          <a:chExt cx="0" cy="0"/>
+        </a:xfrm>
+      </p:grpSpPr>
+      <p:sp>
+        <p:nvSpPr>
+          <p:cNvPr id="4" name="Oval 3">
+            <a:extLst>
+              <a:ext uri="{FF2B5EF4-FFF2-40B4-BE49-F238E27FC236}">
+                <a16:creationId xmlns:a16="http://schemas.microsoft.com/office/drawing/2014/main" id="{B83C8538-8FF1-44D9-B3F5-7349E88C1823}"/>
+              </a:ext>
+            </a:extLst>
+          </p:cNvPr>
+          <p:cNvSpPr/>
+          <p:nvPr/>
+        </p:nvSpPr>
+        <p:spPr>
+          <a:xfrm>
+            <a:off x="7071685" y="3021417"/>
+            <a:ext cx="1675151" cy="1687831"/>
+          </a:xfrm>
+          <a:prstGeom prst="ellipse">
+            <a:avLst/>
+          </a:prstGeom>
+          <a:noFill/>
+          <a:ln>
+            <a:solidFill>
+              <a:schemeClr val="tx1"/>
+            </a:solidFill>
+          </a:ln>
+        </p:spPr>
+        <p:style>
+          <a:lnRef idx="2">
+            <a:schemeClr val="accent1">
+              <a:shade val="50000"/>
+            </a:schemeClr>
+          </a:lnRef>
+          <a:fillRef idx="1">
+            <a:schemeClr val="accent1"/>
+          </a:fillRef>
+          <a:effectRef idx="0">
+            <a:schemeClr val="accent1"/>
+          </a:effectRef>
+          <a:fontRef idx="minor">
+            <a:schemeClr val="lt1"/>
+          </a:fontRef>
+        </p:style>
+        <p:txBody>
+          <a:bodyPr rtlCol="0" anchor="ctr"/>
+          <a:lstStyle/>
+          <a:p>
+            <a:pPr algn="ctr"/>
+            <a:r>
+              <a:rPr lang="en-US" sz="1600" dirty="0">
+                <a:solidFill>
+                  <a:schemeClr val="tx1"/>
+                </a:solidFill>
+              </a:rPr>
+              <a:t>dem60</a:t>
+            </a:r>
+          </a:p>
+        </p:txBody>
+      </p:sp>
+      <p:sp>
+        <p:nvSpPr>
+          <p:cNvPr id="5" name="Rectangle 4">
+            <a:extLst>
+              <a:ext uri="{FF2B5EF4-FFF2-40B4-BE49-F238E27FC236}">
+                <a16:creationId xmlns:a16="http://schemas.microsoft.com/office/drawing/2014/main" id="{DA8A94D2-EA33-4DFF-A675-1A533927716A}"/>
+              </a:ext>
+            </a:extLst>
+          </p:cNvPr>
+          <p:cNvSpPr/>
+          <p:nvPr/>
+        </p:nvSpPr>
+        <p:spPr>
+          <a:xfrm>
+            <a:off x="4818384" y="2739494"/>
+            <a:ext cx="963583" cy="504495"/>
+          </a:xfrm>
+          <a:prstGeom prst="rect">
+            <a:avLst/>
+          </a:prstGeom>
+          <a:noFill/>
+          <a:ln>
+            <a:solidFill>
+              <a:schemeClr val="tx1"/>
+            </a:solidFill>
+          </a:ln>
+        </p:spPr>
+        <p:style>
+          <a:lnRef idx="2">
+            <a:schemeClr val="accent1">
+              <a:shade val="50000"/>
+            </a:schemeClr>
+          </a:lnRef>
+          <a:fillRef idx="1">
+            <a:schemeClr val="accent1"/>
+          </a:fillRef>
+          <a:effectRef idx="0">
+            <a:schemeClr val="accent1"/>
+          </a:effectRef>
+          <a:fontRef idx="minor">
+            <a:schemeClr val="lt1"/>
+          </a:fontRef>
+        </p:style>
+        <p:txBody>
+          <a:bodyPr rtlCol="0" anchor="ctr"/>
+          <a:lstStyle/>
+          <a:p>
+            <a:pPr algn="ctr"/>
+            <a:r>
+              <a:rPr lang="en-US" sz="1400" dirty="0">
+                <a:solidFill>
+                  <a:schemeClr val="tx1"/>
+                </a:solidFill>
+              </a:rPr>
+              <a:t>y2</a:t>
+            </a:r>
+          </a:p>
+        </p:txBody>
+      </p:sp>
+      <p:sp>
+        <p:nvSpPr>
+          <p:cNvPr id="6" name="Rectangle 5">
+            <a:extLst>
+              <a:ext uri="{FF2B5EF4-FFF2-40B4-BE49-F238E27FC236}">
+                <a16:creationId xmlns:a16="http://schemas.microsoft.com/office/drawing/2014/main" id="{55DE9CBE-3DD3-46B5-8123-9576A924636F}"/>
+              </a:ext>
+            </a:extLst>
+          </p:cNvPr>
+          <p:cNvSpPr/>
+          <p:nvPr/>
+        </p:nvSpPr>
+        <p:spPr>
+          <a:xfrm>
+            <a:off x="4797999" y="3599173"/>
+            <a:ext cx="963581" cy="517478"/>
+          </a:xfrm>
+          <a:prstGeom prst="rect">
+            <a:avLst/>
+          </a:prstGeom>
+          <a:noFill/>
+          <a:ln>
+            <a:solidFill>
+              <a:schemeClr val="tx1"/>
+            </a:solidFill>
+          </a:ln>
+        </p:spPr>
+        <p:style>
+          <a:lnRef idx="2">
+            <a:schemeClr val="accent1">
+              <a:shade val="50000"/>
+            </a:schemeClr>
+          </a:lnRef>
+          <a:fillRef idx="1">
+            <a:schemeClr val="accent1"/>
+          </a:fillRef>
+          <a:effectRef idx="0">
+            <a:schemeClr val="accent1"/>
+          </a:effectRef>
+          <a:fontRef idx="minor">
+            <a:schemeClr val="lt1"/>
+          </a:fontRef>
+        </p:style>
+        <p:txBody>
+          <a:bodyPr rtlCol="0" anchor="ctr"/>
+          <a:lstStyle/>
+          <a:p>
+            <a:pPr algn="ctr"/>
+            <a:r>
+              <a:rPr lang="en-US" sz="1400" dirty="0">
+                <a:solidFill>
+                  <a:schemeClr val="tx1"/>
+                </a:solidFill>
+              </a:rPr>
+              <a:t>y3</a:t>
+            </a:r>
+          </a:p>
+        </p:txBody>
+      </p:sp>
+      <p:sp>
+        <p:nvSpPr>
+          <p:cNvPr id="7" name="Rectangle 6">
+            <a:extLst>
+              <a:ext uri="{FF2B5EF4-FFF2-40B4-BE49-F238E27FC236}">
+                <a16:creationId xmlns:a16="http://schemas.microsoft.com/office/drawing/2014/main" id="{C23D9D5E-2D83-4966-8E2E-5569D0FA546E}"/>
+              </a:ext>
+            </a:extLst>
+          </p:cNvPr>
+          <p:cNvSpPr/>
+          <p:nvPr/>
+        </p:nvSpPr>
+        <p:spPr>
+          <a:xfrm>
+            <a:off x="4818382" y="4427323"/>
+            <a:ext cx="963583" cy="504495"/>
+          </a:xfrm>
+          <a:prstGeom prst="rect">
+            <a:avLst/>
+          </a:prstGeom>
+          <a:noFill/>
+          <a:ln>
+            <a:solidFill>
+              <a:schemeClr val="tx1"/>
+            </a:solidFill>
+          </a:ln>
+        </p:spPr>
+        <p:style>
+          <a:lnRef idx="2">
+            <a:schemeClr val="accent1">
+              <a:shade val="50000"/>
+            </a:schemeClr>
+          </a:lnRef>
+          <a:fillRef idx="1">
+            <a:schemeClr val="accent1"/>
+          </a:fillRef>
+          <a:effectRef idx="0">
+            <a:schemeClr val="accent1"/>
+          </a:effectRef>
+          <a:fontRef idx="minor">
+            <a:schemeClr val="lt1"/>
+          </a:fontRef>
+        </p:style>
+        <p:txBody>
+          <a:bodyPr rtlCol="0" anchor="ctr"/>
+          <a:lstStyle/>
+          <a:p>
+            <a:pPr algn="ctr"/>
+            <a:r>
+              <a:rPr lang="en-US" sz="1400" dirty="0">
+                <a:solidFill>
+                  <a:schemeClr val="tx1"/>
+                </a:solidFill>
+              </a:rPr>
+              <a:t>y4</a:t>
+            </a:r>
+          </a:p>
+        </p:txBody>
+      </p:sp>
+      <p:sp>
+        <p:nvSpPr>
+          <p:cNvPr id="9" name="Rectangle 8">
+            <a:extLst>
+              <a:ext uri="{FF2B5EF4-FFF2-40B4-BE49-F238E27FC236}">
+                <a16:creationId xmlns:a16="http://schemas.microsoft.com/office/drawing/2014/main" id="{B13B4E9E-6A4A-4CC8-9D93-E25E220CCEE1}"/>
+              </a:ext>
+            </a:extLst>
+          </p:cNvPr>
+          <p:cNvSpPr/>
+          <p:nvPr/>
+        </p:nvSpPr>
+        <p:spPr>
+          <a:xfrm>
+            <a:off x="4818382" y="1933603"/>
+            <a:ext cx="963583" cy="504495"/>
+          </a:xfrm>
+          <a:prstGeom prst="rect">
+            <a:avLst/>
+          </a:prstGeom>
+          <a:noFill/>
+          <a:ln>
+            <a:solidFill>
+              <a:schemeClr val="tx1"/>
+            </a:solidFill>
+          </a:ln>
+        </p:spPr>
+        <p:style>
+          <a:lnRef idx="2">
+            <a:schemeClr val="accent1">
+              <a:shade val="50000"/>
+            </a:schemeClr>
+          </a:lnRef>
+          <a:fillRef idx="1">
+            <a:schemeClr val="accent1"/>
+          </a:fillRef>
+          <a:effectRef idx="0">
+            <a:schemeClr val="accent1"/>
+          </a:effectRef>
+          <a:fontRef idx="minor">
+            <a:schemeClr val="lt1"/>
+          </a:fontRef>
+        </p:style>
+        <p:txBody>
+          <a:bodyPr rtlCol="0" anchor="ctr"/>
+          <a:lstStyle/>
+          <a:p>
+            <a:pPr algn="ctr"/>
+            <a:r>
+              <a:rPr lang="en-US" sz="1400" dirty="0">
+                <a:solidFill>
+                  <a:schemeClr val="tx1"/>
+                </a:solidFill>
+              </a:rPr>
+              <a:t>y1</a:t>
+            </a:r>
+            <a:endParaRPr lang="en-US" dirty="0">
+              <a:solidFill>
+                <a:schemeClr val="tx1"/>
+              </a:solidFill>
+            </a:endParaRPr>
+          </a:p>
+        </p:txBody>
+      </p:sp>
+      <p:cxnSp>
+        <p:nvCxnSpPr>
+          <p:cNvPr id="10" name="Straight Arrow Connector 9">
+            <a:extLst>
+              <a:ext uri="{FF2B5EF4-FFF2-40B4-BE49-F238E27FC236}">
+                <a16:creationId xmlns:a16="http://schemas.microsoft.com/office/drawing/2014/main" id="{226CE01C-BE27-4703-8EC6-EE4194C7F817}"/>
+              </a:ext>
+            </a:extLst>
+          </p:cNvPr>
+          <p:cNvCxnSpPr>
+            <a:cxnSpLocks/>
+            <a:stCxn id="4" idx="2"/>
+            <a:endCxn id="9" idx="3"/>
+          </p:cNvCxnSpPr>
+          <p:nvPr/>
+        </p:nvCxnSpPr>
+        <p:spPr>
+          <a:xfrm flipH="1" flipV="1">
+            <a:off x="5781965" y="2185851"/>
+            <a:ext cx="1289720" cy="1679482"/>
+          </a:xfrm>
+          <a:prstGeom prst="straightConnector1">
+            <a:avLst/>
+          </a:prstGeom>
+          <a:ln>
+            <a:solidFill>
+              <a:schemeClr val="tx1"/>
+            </a:solidFill>
+            <a:tailEnd type="triangle"/>
+          </a:ln>
+        </p:spPr>
+        <p:style>
+          <a:lnRef idx="1">
+            <a:schemeClr val="accent1"/>
+          </a:lnRef>
+          <a:fillRef idx="0">
+            <a:schemeClr val="accent1"/>
+          </a:fillRef>
+          <a:effectRef idx="0">
+            <a:schemeClr val="accent1"/>
+          </a:effectRef>
+          <a:fontRef idx="minor">
+            <a:schemeClr val="tx1"/>
+          </a:fontRef>
+        </p:style>
+      </p:cxnSp>
+      <p:cxnSp>
+        <p:nvCxnSpPr>
+          <p:cNvPr id="11" name="Straight Arrow Connector 10">
+            <a:extLst>
+              <a:ext uri="{FF2B5EF4-FFF2-40B4-BE49-F238E27FC236}">
+                <a16:creationId xmlns:a16="http://schemas.microsoft.com/office/drawing/2014/main" id="{5AF581AC-39EC-4676-86A5-B98AAAAE1313}"/>
+              </a:ext>
+            </a:extLst>
+          </p:cNvPr>
+          <p:cNvCxnSpPr>
+            <a:cxnSpLocks/>
+            <a:stCxn id="4" idx="2"/>
+            <a:endCxn id="5" idx="3"/>
+          </p:cNvCxnSpPr>
+          <p:nvPr/>
+        </p:nvCxnSpPr>
+        <p:spPr>
+          <a:xfrm flipH="1" flipV="1">
+            <a:off x="5781966" y="2991742"/>
+            <a:ext cx="1289719" cy="873592"/>
+          </a:xfrm>
+          <a:prstGeom prst="straightConnector1">
+            <a:avLst/>
+          </a:prstGeom>
+          <a:ln>
+            <a:solidFill>
+              <a:schemeClr val="tx1"/>
+            </a:solidFill>
+            <a:tailEnd type="triangle"/>
+          </a:ln>
+        </p:spPr>
+        <p:style>
+          <a:lnRef idx="1">
+            <a:schemeClr val="accent1"/>
+          </a:lnRef>
+          <a:fillRef idx="0">
+            <a:schemeClr val="accent1"/>
+          </a:fillRef>
+          <a:effectRef idx="0">
+            <a:schemeClr val="accent1"/>
+          </a:effectRef>
+          <a:fontRef idx="minor">
+            <a:schemeClr val="tx1"/>
+          </a:fontRef>
+        </p:style>
+      </p:cxnSp>
+      <p:cxnSp>
+        <p:nvCxnSpPr>
+          <p:cNvPr id="12" name="Straight Arrow Connector 11">
+            <a:extLst>
+              <a:ext uri="{FF2B5EF4-FFF2-40B4-BE49-F238E27FC236}">
+                <a16:creationId xmlns:a16="http://schemas.microsoft.com/office/drawing/2014/main" id="{ABFE9D0B-A571-434A-8FB3-CEB86427B906}"/>
+              </a:ext>
+            </a:extLst>
+          </p:cNvPr>
+          <p:cNvCxnSpPr>
+            <a:cxnSpLocks/>
+            <a:stCxn id="4" idx="2"/>
+            <a:endCxn id="6" idx="3"/>
+          </p:cNvCxnSpPr>
+          <p:nvPr/>
+        </p:nvCxnSpPr>
+        <p:spPr>
+          <a:xfrm flipH="1" flipV="1">
+            <a:off x="5761581" y="3857912"/>
+            <a:ext cx="1310105" cy="7422"/>
+          </a:xfrm>
+          <a:prstGeom prst="straightConnector1">
+            <a:avLst/>
+          </a:prstGeom>
+          <a:ln>
+            <a:solidFill>
+              <a:schemeClr val="tx1"/>
+            </a:solidFill>
+            <a:tailEnd type="triangle"/>
+          </a:ln>
+        </p:spPr>
+        <p:style>
+          <a:lnRef idx="1">
+            <a:schemeClr val="accent1"/>
+          </a:lnRef>
+          <a:fillRef idx="0">
+            <a:schemeClr val="accent1"/>
+          </a:fillRef>
+          <a:effectRef idx="0">
+            <a:schemeClr val="accent1"/>
+          </a:effectRef>
+          <a:fontRef idx="minor">
+            <a:schemeClr val="tx1"/>
+          </a:fontRef>
+        </p:style>
+      </p:cxnSp>
+      <p:cxnSp>
+        <p:nvCxnSpPr>
+          <p:cNvPr id="13" name="Straight Arrow Connector 12">
+            <a:extLst>
+              <a:ext uri="{FF2B5EF4-FFF2-40B4-BE49-F238E27FC236}">
+                <a16:creationId xmlns:a16="http://schemas.microsoft.com/office/drawing/2014/main" id="{D7895D3C-0326-481E-A1F4-21AC12FDD442}"/>
+              </a:ext>
+            </a:extLst>
+          </p:cNvPr>
+          <p:cNvCxnSpPr>
+            <a:cxnSpLocks/>
+            <a:stCxn id="4" idx="2"/>
+            <a:endCxn id="7" idx="3"/>
+          </p:cNvCxnSpPr>
+          <p:nvPr/>
+        </p:nvCxnSpPr>
+        <p:spPr>
+          <a:xfrm flipH="1">
+            <a:off x="5781965" y="3865333"/>
+            <a:ext cx="1289720" cy="814238"/>
+          </a:xfrm>
+          <a:prstGeom prst="straightConnector1">
+            <a:avLst/>
+          </a:prstGeom>
+          <a:ln>
+            <a:solidFill>
+              <a:schemeClr val="tx1"/>
+            </a:solidFill>
+            <a:tailEnd type="triangle"/>
+          </a:ln>
+        </p:spPr>
+        <p:style>
+          <a:lnRef idx="1">
+            <a:schemeClr val="accent1"/>
+          </a:lnRef>
+          <a:fillRef idx="0">
+            <a:schemeClr val="accent1"/>
+          </a:fillRef>
+          <a:effectRef idx="0">
+            <a:schemeClr val="accent1"/>
+          </a:effectRef>
+          <a:fontRef idx="minor">
+            <a:schemeClr val="tx1"/>
+          </a:fontRef>
+        </p:style>
+      </p:cxnSp>
+      <p:sp>
+        <p:nvSpPr>
+          <p:cNvPr id="15" name="Oval 14">
+            <a:extLst>
+              <a:ext uri="{FF2B5EF4-FFF2-40B4-BE49-F238E27FC236}">
+                <a16:creationId xmlns:a16="http://schemas.microsoft.com/office/drawing/2014/main" id="{12619037-73DA-4BFB-AFC6-10AAAFFB0FCD}"/>
+              </a:ext>
+            </a:extLst>
+          </p:cNvPr>
+          <p:cNvSpPr/>
+          <p:nvPr/>
+        </p:nvSpPr>
+        <p:spPr>
+          <a:xfrm>
+            <a:off x="3680615" y="1933603"/>
+            <a:ext cx="504027" cy="511915"/>
+          </a:xfrm>
+          <a:prstGeom prst="ellipse">
+            <a:avLst/>
+          </a:prstGeom>
+          <a:noFill/>
+          <a:ln>
+            <a:solidFill>
+              <a:schemeClr val="tx1"/>
+            </a:solidFill>
+          </a:ln>
+        </p:spPr>
+        <p:style>
+          <a:lnRef idx="2">
+            <a:schemeClr val="accent1">
+              <a:shade val="50000"/>
+            </a:schemeClr>
+          </a:lnRef>
+          <a:fillRef idx="1">
+            <a:schemeClr val="accent1"/>
+          </a:fillRef>
+          <a:effectRef idx="0">
+            <a:schemeClr val="accent1"/>
+          </a:effectRef>
+          <a:fontRef idx="minor">
+            <a:schemeClr val="lt1"/>
+          </a:fontRef>
+        </p:style>
+        <p:txBody>
+          <a:bodyPr rtlCol="0" anchor="ctr"/>
+          <a:lstStyle/>
+          <a:p>
+            <a:pPr algn="ctr"/>
+            <a:r>
+              <a:rPr lang="en-US" dirty="0">
+                <a:solidFill>
+                  <a:schemeClr val="tx1"/>
+                </a:solidFill>
+              </a:rPr>
+              <a:t>e</a:t>
+            </a:r>
+          </a:p>
+        </p:txBody>
+      </p:sp>
+      <p:cxnSp>
+        <p:nvCxnSpPr>
+          <p:cNvPr id="16" name="Straight Arrow Connector 15">
+            <a:extLst>
+              <a:ext uri="{FF2B5EF4-FFF2-40B4-BE49-F238E27FC236}">
+                <a16:creationId xmlns:a16="http://schemas.microsoft.com/office/drawing/2014/main" id="{68F680C3-0F65-4893-A148-F2CC8B44D6CA}"/>
+              </a:ext>
+            </a:extLst>
+          </p:cNvPr>
+          <p:cNvCxnSpPr>
+            <a:cxnSpLocks/>
+            <a:stCxn id="15" idx="6"/>
+            <a:endCxn id="9" idx="1"/>
+          </p:cNvCxnSpPr>
+          <p:nvPr/>
+        </p:nvCxnSpPr>
+        <p:spPr>
+          <a:xfrm flipV="1">
+            <a:off x="4184642" y="2185851"/>
+            <a:ext cx="633741" cy="3709"/>
+          </a:xfrm>
+          <a:prstGeom prst="straightConnector1">
+            <a:avLst/>
+          </a:prstGeom>
+          <a:ln>
+            <a:solidFill>
+              <a:schemeClr val="tx1"/>
+            </a:solidFill>
+            <a:tailEnd type="triangle"/>
+          </a:ln>
+        </p:spPr>
+        <p:style>
+          <a:lnRef idx="1">
+            <a:schemeClr val="accent1"/>
+          </a:lnRef>
+          <a:fillRef idx="0">
+            <a:schemeClr val="accent1"/>
+          </a:fillRef>
+          <a:effectRef idx="0">
+            <a:schemeClr val="accent1"/>
+          </a:effectRef>
+          <a:fontRef idx="minor">
+            <a:schemeClr val="tx1"/>
+          </a:fontRef>
+        </p:style>
+      </p:cxnSp>
+      <p:sp>
+        <p:nvSpPr>
+          <p:cNvPr id="17" name="Oval 16">
+            <a:extLst>
+              <a:ext uri="{FF2B5EF4-FFF2-40B4-BE49-F238E27FC236}">
+                <a16:creationId xmlns:a16="http://schemas.microsoft.com/office/drawing/2014/main" id="{84807ACF-76C8-4D19-B37F-328F39CE1470}"/>
+              </a:ext>
+            </a:extLst>
+          </p:cNvPr>
+          <p:cNvSpPr/>
+          <p:nvPr/>
+        </p:nvSpPr>
+        <p:spPr>
+          <a:xfrm>
+            <a:off x="3689880" y="2822956"/>
+            <a:ext cx="504027" cy="511915"/>
+          </a:xfrm>
+          <a:prstGeom prst="ellipse">
+            <a:avLst/>
+          </a:prstGeom>
+          <a:noFill/>
+          <a:ln>
+            <a:solidFill>
+              <a:schemeClr val="tx1"/>
+            </a:solidFill>
+          </a:ln>
+        </p:spPr>
+        <p:style>
+          <a:lnRef idx="2">
+            <a:schemeClr val="accent1">
+              <a:shade val="50000"/>
+            </a:schemeClr>
+          </a:lnRef>
+          <a:fillRef idx="1">
+            <a:schemeClr val="accent1"/>
+          </a:fillRef>
+          <a:effectRef idx="0">
+            <a:schemeClr val="accent1"/>
+          </a:effectRef>
+          <a:fontRef idx="minor">
+            <a:schemeClr val="lt1"/>
+          </a:fontRef>
+        </p:style>
+        <p:txBody>
+          <a:bodyPr rtlCol="0" anchor="ctr"/>
+          <a:lstStyle/>
+          <a:p>
+            <a:pPr algn="ctr"/>
+            <a:r>
+              <a:rPr lang="en-US" dirty="0">
+                <a:solidFill>
+                  <a:schemeClr val="tx1"/>
+                </a:solidFill>
+              </a:rPr>
+              <a:t>e</a:t>
+            </a:r>
+          </a:p>
+        </p:txBody>
+      </p:sp>
+      <p:cxnSp>
+        <p:nvCxnSpPr>
+          <p:cNvPr id="18" name="Straight Arrow Connector 17">
+            <a:extLst>
+              <a:ext uri="{FF2B5EF4-FFF2-40B4-BE49-F238E27FC236}">
+                <a16:creationId xmlns:a16="http://schemas.microsoft.com/office/drawing/2014/main" id="{86E20E4E-49FC-4E61-851E-DEEF0D385B55}"/>
+              </a:ext>
+            </a:extLst>
+          </p:cNvPr>
+          <p:cNvCxnSpPr>
+            <a:stCxn id="17" idx="6"/>
+          </p:cNvCxnSpPr>
+          <p:nvPr/>
+        </p:nvCxnSpPr>
+        <p:spPr>
+          <a:xfrm flipV="1">
+            <a:off x="4193907" y="3075204"/>
+            <a:ext cx="633741" cy="3709"/>
+          </a:xfrm>
+          <a:prstGeom prst="straightConnector1">
+            <a:avLst/>
+          </a:prstGeom>
+          <a:ln>
+            <a:solidFill>
+              <a:schemeClr val="tx1"/>
+            </a:solidFill>
+            <a:tailEnd type="triangle"/>
+          </a:ln>
+        </p:spPr>
+        <p:style>
+          <a:lnRef idx="1">
+            <a:schemeClr val="accent1"/>
+          </a:lnRef>
+          <a:fillRef idx="0">
+            <a:schemeClr val="accent1"/>
+          </a:fillRef>
+          <a:effectRef idx="0">
+            <a:schemeClr val="accent1"/>
+          </a:effectRef>
+          <a:fontRef idx="minor">
+            <a:schemeClr val="tx1"/>
+          </a:fontRef>
+        </p:style>
+      </p:cxnSp>
+      <p:sp>
+        <p:nvSpPr>
+          <p:cNvPr id="19" name="Oval 18">
+            <a:extLst>
+              <a:ext uri="{FF2B5EF4-FFF2-40B4-BE49-F238E27FC236}">
+                <a16:creationId xmlns:a16="http://schemas.microsoft.com/office/drawing/2014/main" id="{880EF362-5DE8-434C-A8CE-E9B96B6086C9}"/>
+              </a:ext>
+            </a:extLst>
+          </p:cNvPr>
+          <p:cNvSpPr/>
+          <p:nvPr/>
+        </p:nvSpPr>
+        <p:spPr>
+          <a:xfrm>
+            <a:off x="3680615" y="3585265"/>
+            <a:ext cx="504027" cy="511915"/>
+          </a:xfrm>
+          <a:prstGeom prst="ellipse">
+            <a:avLst/>
+          </a:prstGeom>
+          <a:noFill/>
+          <a:ln>
+            <a:solidFill>
+              <a:schemeClr val="tx1"/>
+            </a:solidFill>
+          </a:ln>
+        </p:spPr>
+        <p:style>
+          <a:lnRef idx="2">
+            <a:schemeClr val="accent1">
+              <a:shade val="50000"/>
+            </a:schemeClr>
+          </a:lnRef>
+          <a:fillRef idx="1">
+            <a:schemeClr val="accent1"/>
+          </a:fillRef>
+          <a:effectRef idx="0">
+            <a:schemeClr val="accent1"/>
+          </a:effectRef>
+          <a:fontRef idx="minor">
+            <a:schemeClr val="lt1"/>
+          </a:fontRef>
+        </p:style>
+        <p:txBody>
+          <a:bodyPr rtlCol="0" anchor="ctr"/>
+          <a:lstStyle/>
+          <a:p>
+            <a:pPr algn="ctr"/>
+            <a:r>
+              <a:rPr lang="en-US" dirty="0">
+                <a:solidFill>
+                  <a:schemeClr val="tx1"/>
+                </a:solidFill>
+              </a:rPr>
+              <a:t>e</a:t>
+            </a:r>
+          </a:p>
+        </p:txBody>
+      </p:sp>
+      <p:cxnSp>
+        <p:nvCxnSpPr>
+          <p:cNvPr id="20" name="Straight Arrow Connector 19">
+            <a:extLst>
+              <a:ext uri="{FF2B5EF4-FFF2-40B4-BE49-F238E27FC236}">
+                <a16:creationId xmlns:a16="http://schemas.microsoft.com/office/drawing/2014/main" id="{3D4F46AE-1C67-4A10-83E8-94ED11E9D780}"/>
+              </a:ext>
+            </a:extLst>
+          </p:cNvPr>
+          <p:cNvCxnSpPr>
+            <a:stCxn id="19" idx="6"/>
+          </p:cNvCxnSpPr>
+          <p:nvPr/>
+        </p:nvCxnSpPr>
+        <p:spPr>
+          <a:xfrm flipV="1">
+            <a:off x="4184642" y="3837513"/>
+            <a:ext cx="633741" cy="3709"/>
+          </a:xfrm>
+          <a:prstGeom prst="straightConnector1">
+            <a:avLst/>
+          </a:prstGeom>
+          <a:ln>
+            <a:solidFill>
+              <a:schemeClr val="tx1"/>
+            </a:solidFill>
+            <a:tailEnd type="triangle"/>
+          </a:ln>
+        </p:spPr>
+        <p:style>
+          <a:lnRef idx="1">
+            <a:schemeClr val="accent1"/>
+          </a:lnRef>
+          <a:fillRef idx="0">
+            <a:schemeClr val="accent1"/>
+          </a:fillRef>
+          <a:effectRef idx="0">
+            <a:schemeClr val="accent1"/>
+          </a:effectRef>
+          <a:fontRef idx="minor">
+            <a:schemeClr val="tx1"/>
+          </a:fontRef>
+        </p:style>
+      </p:cxnSp>
+      <p:sp>
+        <p:nvSpPr>
+          <p:cNvPr id="21" name="Oval 20">
+            <a:extLst>
+              <a:ext uri="{FF2B5EF4-FFF2-40B4-BE49-F238E27FC236}">
+                <a16:creationId xmlns:a16="http://schemas.microsoft.com/office/drawing/2014/main" id="{0A40A378-FB28-4E93-8137-5E0F48B6495B}"/>
+              </a:ext>
+            </a:extLst>
+          </p:cNvPr>
+          <p:cNvSpPr/>
+          <p:nvPr/>
+        </p:nvSpPr>
+        <p:spPr>
+          <a:xfrm>
+            <a:off x="3680615" y="4419903"/>
+            <a:ext cx="504027" cy="511915"/>
+          </a:xfrm>
+          <a:prstGeom prst="ellipse">
+            <a:avLst/>
+          </a:prstGeom>
+          <a:noFill/>
+          <a:ln>
+            <a:solidFill>
+              <a:schemeClr val="tx1"/>
+            </a:solidFill>
+          </a:ln>
+        </p:spPr>
+        <p:style>
+          <a:lnRef idx="2">
+            <a:schemeClr val="accent1">
+              <a:shade val="50000"/>
+            </a:schemeClr>
+          </a:lnRef>
+          <a:fillRef idx="1">
+            <a:schemeClr val="accent1"/>
+          </a:fillRef>
+          <a:effectRef idx="0">
+            <a:schemeClr val="accent1"/>
+          </a:effectRef>
+          <a:fontRef idx="minor">
+            <a:schemeClr val="lt1"/>
+          </a:fontRef>
+        </p:style>
+        <p:txBody>
+          <a:bodyPr rtlCol="0" anchor="ctr"/>
+          <a:lstStyle/>
+          <a:p>
+            <a:pPr algn="ctr"/>
+            <a:r>
+              <a:rPr lang="en-US" dirty="0">
+                <a:solidFill>
+                  <a:schemeClr val="tx1"/>
+                </a:solidFill>
+              </a:rPr>
+              <a:t>e</a:t>
+            </a:r>
+          </a:p>
+        </p:txBody>
+      </p:sp>
+      <p:cxnSp>
+        <p:nvCxnSpPr>
+          <p:cNvPr id="22" name="Straight Arrow Connector 21">
+            <a:extLst>
+              <a:ext uri="{FF2B5EF4-FFF2-40B4-BE49-F238E27FC236}">
+                <a16:creationId xmlns:a16="http://schemas.microsoft.com/office/drawing/2014/main" id="{CAE1D2F6-5827-4E23-A1A8-ECB0EE616467}"/>
+              </a:ext>
+            </a:extLst>
+          </p:cNvPr>
+          <p:cNvCxnSpPr>
+            <a:stCxn id="21" idx="6"/>
+          </p:cNvCxnSpPr>
+          <p:nvPr/>
+        </p:nvCxnSpPr>
+        <p:spPr>
+          <a:xfrm flipV="1">
+            <a:off x="4184642" y="4672151"/>
+            <a:ext cx="633741" cy="3709"/>
+          </a:xfrm>
+          <a:prstGeom prst="straightConnector1">
+            <a:avLst/>
+          </a:prstGeom>
+          <a:ln>
+            <a:solidFill>
+              <a:schemeClr val="tx1"/>
+            </a:solidFill>
+            <a:tailEnd type="triangle"/>
+          </a:ln>
+        </p:spPr>
+        <p:style>
+          <a:lnRef idx="1">
+            <a:schemeClr val="accent1"/>
+          </a:lnRef>
+          <a:fillRef idx="0">
+            <a:schemeClr val="accent1"/>
+          </a:fillRef>
+          <a:effectRef idx="0">
+            <a:schemeClr val="accent1"/>
+          </a:effectRef>
+          <a:fontRef idx="minor">
+            <a:schemeClr val="tx1"/>
+          </a:fontRef>
+        </p:style>
+      </p:cxnSp>
+      <p:sp>
+        <p:nvSpPr>
+          <p:cNvPr id="25" name="Oval 24">
+            <a:extLst>
+              <a:ext uri="{FF2B5EF4-FFF2-40B4-BE49-F238E27FC236}">
+                <a16:creationId xmlns:a16="http://schemas.microsoft.com/office/drawing/2014/main" id="{C0B9A408-2198-4FCE-AB10-1311CE959B34}"/>
+              </a:ext>
+            </a:extLst>
+          </p:cNvPr>
+          <p:cNvSpPr/>
+          <p:nvPr/>
+        </p:nvSpPr>
+        <p:spPr>
+          <a:xfrm>
+            <a:off x="7457116" y="1926181"/>
+            <a:ext cx="504027" cy="511915"/>
+          </a:xfrm>
+          <a:prstGeom prst="ellipse">
+            <a:avLst/>
+          </a:prstGeom>
+          <a:noFill/>
+          <a:ln>
+            <a:solidFill>
+              <a:schemeClr val="tx1"/>
+            </a:solidFill>
+          </a:ln>
+        </p:spPr>
+        <p:style>
+          <a:lnRef idx="2">
+            <a:schemeClr val="accent1">
+              <a:shade val="50000"/>
+            </a:schemeClr>
+          </a:lnRef>
+          <a:fillRef idx="1">
+            <a:schemeClr val="accent1"/>
+          </a:fillRef>
+          <a:effectRef idx="0">
+            <a:schemeClr val="accent1"/>
+          </a:effectRef>
+          <a:fontRef idx="minor">
+            <a:schemeClr val="lt1"/>
+          </a:fontRef>
+        </p:style>
+        <p:txBody>
+          <a:bodyPr rtlCol="0" anchor="ctr"/>
+          <a:lstStyle/>
+          <a:p>
+            <a:pPr algn="ctr"/>
+            <a:r>
+              <a:rPr lang="en-US" dirty="0">
+                <a:solidFill>
+                  <a:schemeClr val="tx1"/>
+                </a:solidFill>
+              </a:rPr>
+              <a:t>e</a:t>
+            </a:r>
+          </a:p>
+        </p:txBody>
+      </p:sp>
+      <p:cxnSp>
+        <p:nvCxnSpPr>
+          <p:cNvPr id="26" name="Straight Arrow Connector 25">
+            <a:extLst>
+              <a:ext uri="{FF2B5EF4-FFF2-40B4-BE49-F238E27FC236}">
+                <a16:creationId xmlns:a16="http://schemas.microsoft.com/office/drawing/2014/main" id="{2340A85C-423A-4CEF-B804-92C6EB0AA250}"/>
+              </a:ext>
+            </a:extLst>
+          </p:cNvPr>
+          <p:cNvCxnSpPr>
+            <a:cxnSpLocks/>
+            <a:stCxn id="25" idx="4"/>
+            <a:endCxn id="4" idx="0"/>
+          </p:cNvCxnSpPr>
+          <p:nvPr/>
+        </p:nvCxnSpPr>
+        <p:spPr>
+          <a:xfrm>
+            <a:off x="7709129" y="2438096"/>
+            <a:ext cx="200132" cy="583321"/>
+          </a:xfrm>
+          <a:prstGeom prst="straightConnector1">
+            <a:avLst/>
+          </a:prstGeom>
+          <a:ln>
+            <a:solidFill>
+              <a:schemeClr val="tx1"/>
+            </a:solidFill>
+            <a:tailEnd type="triangle"/>
+          </a:ln>
+        </p:spPr>
+        <p:style>
+          <a:lnRef idx="1">
+            <a:schemeClr val="accent1"/>
+          </a:lnRef>
+          <a:fillRef idx="0">
+            <a:schemeClr val="accent1"/>
+          </a:fillRef>
+          <a:effectRef idx="0">
+            <a:schemeClr val="accent1"/>
+          </a:effectRef>
+          <a:fontRef idx="minor">
+            <a:schemeClr val="tx1"/>
+          </a:fontRef>
+        </p:style>
+      </p:cxnSp>
+      <p:sp>
+        <p:nvSpPr>
+          <p:cNvPr id="23" name="Oval 22">
+            <a:extLst>
+              <a:ext uri="{FF2B5EF4-FFF2-40B4-BE49-F238E27FC236}">
+                <a16:creationId xmlns:a16="http://schemas.microsoft.com/office/drawing/2014/main" id="{4042141F-AF35-4341-8900-C10208308640}"/>
+              </a:ext>
+            </a:extLst>
+          </p:cNvPr>
+          <p:cNvSpPr/>
+          <p:nvPr/>
+        </p:nvSpPr>
+        <p:spPr>
+          <a:xfrm>
+            <a:off x="6383193" y="2483536"/>
+            <a:ext cx="504027" cy="511915"/>
+          </a:xfrm>
+          <a:prstGeom prst="ellipse">
+            <a:avLst/>
+          </a:prstGeom>
+          <a:noFill/>
+          <a:ln>
+            <a:solidFill>
+              <a:schemeClr val="tx1"/>
+            </a:solidFill>
+          </a:ln>
+        </p:spPr>
+        <p:style>
+          <a:lnRef idx="2">
+            <a:schemeClr val="accent1">
+              <a:shade val="50000"/>
+            </a:schemeClr>
+          </a:lnRef>
+          <a:fillRef idx="1">
+            <a:schemeClr val="accent1"/>
+          </a:fillRef>
+          <a:effectRef idx="0">
+            <a:schemeClr val="accent1"/>
+          </a:effectRef>
+          <a:fontRef idx="minor">
+            <a:schemeClr val="lt1"/>
+          </a:fontRef>
+        </p:style>
+        <p:txBody>
+          <a:bodyPr rtlCol="0" anchor="ctr"/>
+          <a:lstStyle/>
+          <a:p>
+            <a:pPr algn="ctr"/>
+            <a:r>
+              <a:rPr lang="en-US" dirty="0">
+                <a:solidFill>
+                  <a:schemeClr val="tx1"/>
+                </a:solidFill>
+              </a:rPr>
+              <a:t>e</a:t>
+            </a:r>
+          </a:p>
+        </p:txBody>
+      </p:sp>
+    </p:spTree>
+    <p:extLst>
+      <p:ext uri="{BB962C8B-B14F-4D97-AF65-F5344CB8AC3E}">
+        <p14:creationId xmlns:p14="http://schemas.microsoft.com/office/powerpoint/2010/main" val="2480692902"/>
       </p:ext>
     </p:extLst>
   </p:cSld>

</xml_diff>